<commit_message>
crud products et cart done;
</commit_message>
<xml_diff>
--- a/documents/Projet e-commerce.pptx
+++ b/documents/Projet e-commerce.pptx
@@ -21120,6 +21120,210 @@
             <a:r>
               <a:rPr lang="fr-FR" dirty="0" smtClean="0"/>
               <a:t>8</a:t>
+            </a:r>
+            <a:endParaRPr lang="fr-FR" dirty="0"/>
+          </a:p>
+        </p:txBody>
+      </p:sp>
+      <p:sp>
+        <p:nvSpPr>
+          <p:cNvPr id="13" name="ZoneTexte 12"/>
+          <p:cNvSpPr txBox="1"/>
+          <p:nvPr/>
+        </p:nvSpPr>
+        <p:spPr>
+          <a:xfrm>
+            <a:off x="214282" y="3429000"/>
+            <a:ext cx="1214446" cy="369332"/>
+          </a:xfrm>
+          <a:prstGeom prst="rect">
+            <a:avLst/>
+          </a:prstGeom>
+          <a:noFill/>
+        </p:spPr>
+        <p:txBody>
+          <a:bodyPr wrap="square" rtlCol="0">
+            <a:spAutoFit/>
+          </a:bodyPr>
+          <a:lstStyle/>
+          <a:p>
+            <a:r>
+              <a:rPr lang="fr-FR" dirty="0" err="1" smtClean="0"/>
+              <a:t>Crud</a:t>
+            </a:r>
+            <a:r>
+              <a:rPr lang="fr-FR" dirty="0" smtClean="0"/>
+              <a:t> ok</a:t>
+            </a:r>
+            <a:endParaRPr lang="fr-FR" dirty="0"/>
+          </a:p>
+        </p:txBody>
+      </p:sp>
+      <p:sp>
+        <p:nvSpPr>
+          <p:cNvPr id="14" name="ZoneTexte 13"/>
+          <p:cNvSpPr txBox="1"/>
+          <p:nvPr/>
+        </p:nvSpPr>
+        <p:spPr>
+          <a:xfrm>
+            <a:off x="6215074" y="1857364"/>
+            <a:ext cx="1214446" cy="369332"/>
+          </a:xfrm>
+          <a:prstGeom prst="rect">
+            <a:avLst/>
+          </a:prstGeom>
+          <a:noFill/>
+        </p:spPr>
+        <p:txBody>
+          <a:bodyPr wrap="square" rtlCol="0">
+            <a:spAutoFit/>
+          </a:bodyPr>
+          <a:lstStyle/>
+          <a:p>
+            <a:r>
+              <a:rPr lang="fr-FR" dirty="0" err="1" smtClean="0"/>
+              <a:t>Crud</a:t>
+            </a:r>
+            <a:r>
+              <a:rPr lang="fr-FR" dirty="0" smtClean="0"/>
+              <a:t> ok</a:t>
+            </a:r>
+            <a:endParaRPr lang="fr-FR" dirty="0"/>
+          </a:p>
+        </p:txBody>
+      </p:sp>
+      <p:sp>
+        <p:nvSpPr>
+          <p:cNvPr id="15" name="ZoneTexte 14"/>
+          <p:cNvSpPr txBox="1"/>
+          <p:nvPr/>
+        </p:nvSpPr>
+        <p:spPr>
+          <a:xfrm>
+            <a:off x="5072066" y="5357826"/>
+            <a:ext cx="1214446" cy="369332"/>
+          </a:xfrm>
+          <a:prstGeom prst="rect">
+            <a:avLst/>
+          </a:prstGeom>
+          <a:noFill/>
+        </p:spPr>
+        <p:txBody>
+          <a:bodyPr wrap="square" rtlCol="0">
+            <a:spAutoFit/>
+          </a:bodyPr>
+          <a:lstStyle/>
+          <a:p>
+            <a:r>
+              <a:rPr lang="fr-FR" dirty="0" err="1" smtClean="0"/>
+              <a:t>Crud</a:t>
+            </a:r>
+            <a:r>
+              <a:rPr lang="fr-FR" dirty="0" smtClean="0"/>
+              <a:t> ok</a:t>
+            </a:r>
+            <a:endParaRPr lang="fr-FR" dirty="0"/>
+          </a:p>
+        </p:txBody>
+      </p:sp>
+      <p:sp>
+        <p:nvSpPr>
+          <p:cNvPr id="16" name="ZoneTexte 15"/>
+          <p:cNvSpPr txBox="1"/>
+          <p:nvPr/>
+        </p:nvSpPr>
+        <p:spPr>
+          <a:xfrm>
+            <a:off x="7072330" y="4786322"/>
+            <a:ext cx="1214446" cy="369332"/>
+          </a:xfrm>
+          <a:prstGeom prst="rect">
+            <a:avLst/>
+          </a:prstGeom>
+          <a:noFill/>
+        </p:spPr>
+        <p:txBody>
+          <a:bodyPr wrap="square" rtlCol="0">
+            <a:spAutoFit/>
+          </a:bodyPr>
+          <a:lstStyle/>
+          <a:p>
+            <a:r>
+              <a:rPr lang="fr-FR" dirty="0" err="1" smtClean="0"/>
+              <a:t>Crud</a:t>
+            </a:r>
+            <a:r>
+              <a:rPr lang="fr-FR" dirty="0" smtClean="0"/>
+              <a:t> ok</a:t>
+            </a:r>
+            <a:endParaRPr lang="fr-FR" dirty="0"/>
+          </a:p>
+        </p:txBody>
+      </p:sp>
+      <p:sp>
+        <p:nvSpPr>
+          <p:cNvPr id="17" name="ZoneTexte 16"/>
+          <p:cNvSpPr txBox="1"/>
+          <p:nvPr/>
+        </p:nvSpPr>
+        <p:spPr>
+          <a:xfrm>
+            <a:off x="6858016" y="5572140"/>
+            <a:ext cx="1214446" cy="369332"/>
+          </a:xfrm>
+          <a:prstGeom prst="rect">
+            <a:avLst/>
+          </a:prstGeom>
+          <a:noFill/>
+        </p:spPr>
+        <p:txBody>
+          <a:bodyPr wrap="square" rtlCol="0">
+            <a:spAutoFit/>
+          </a:bodyPr>
+          <a:lstStyle/>
+          <a:p>
+            <a:r>
+              <a:rPr lang="fr-FR" dirty="0" err="1" smtClean="0"/>
+              <a:t>Crud</a:t>
+            </a:r>
+            <a:r>
+              <a:rPr lang="fr-FR" dirty="0" smtClean="0"/>
+              <a:t> ok</a:t>
+            </a:r>
+            <a:endParaRPr lang="fr-FR" dirty="0"/>
+          </a:p>
+        </p:txBody>
+      </p:sp>
+      <p:sp>
+        <p:nvSpPr>
+          <p:cNvPr id="18" name="ZoneTexte 17"/>
+          <p:cNvSpPr txBox="1"/>
+          <p:nvPr/>
+        </p:nvSpPr>
+        <p:spPr>
+          <a:xfrm>
+            <a:off x="2857488" y="3357562"/>
+            <a:ext cx="1214446" cy="369332"/>
+          </a:xfrm>
+          <a:prstGeom prst="rect">
+            <a:avLst/>
+          </a:prstGeom>
+          <a:noFill/>
+        </p:spPr>
+        <p:txBody>
+          <a:bodyPr wrap="square" rtlCol="0">
+            <a:spAutoFit/>
+          </a:bodyPr>
+          <a:lstStyle/>
+          <a:p>
+            <a:r>
+              <a:rPr lang="fr-FR" dirty="0" err="1" smtClean="0"/>
+              <a:t>Crud</a:t>
+            </a:r>
+            <a:r>
+              <a:rPr lang="fr-FR" dirty="0" smtClean="0"/>
+              <a:t> ok</a:t>
             </a:r>
             <a:endParaRPr lang="fr-FR" dirty="0"/>
           </a:p>

</xml_diff>